<commit_message>
added kubernates deploymemnt and service yaml
</commit_message>
<xml_diff>
--- a/docs/high-level-arch.pptx
+++ b/docs/high-level-arch.pptx
@@ -104,6 +104,11 @@
       </a:defRPr>
     </a:lvl9pPr>
   </p:defaultTextStyle>
+  <p:extLst>
+    <p:ext uri="{EFAFB233-063F-42B5-8137-9DF3F51BA10A}">
+      <p15:sldGuideLst xmlns:p15="http://schemas.microsoft.com/office/powerpoint/2012/main"/>
+    </p:ext>
+  </p:extLst>
 </p:presentation>
 </file>
 
@@ -238,7 +243,7 @@
           <a:p>
             <a:fld id="{148E3385-EF55-40F7-BBE9-92DC08C2CB6F}" type="datetimeFigureOut">
               <a:rPr lang="en-US" smtClean="0"/>
-              <a:t>4/12/2019</a:t>
+              <a:t>4/17/2019</a:t>
             </a:fld>
             <a:endParaRPr lang="en-US"/>
           </a:p>
@@ -408,7 +413,7 @@
           <a:p>
             <a:fld id="{148E3385-EF55-40F7-BBE9-92DC08C2CB6F}" type="datetimeFigureOut">
               <a:rPr lang="en-US" smtClean="0"/>
-              <a:t>4/12/2019</a:t>
+              <a:t>4/17/2019</a:t>
             </a:fld>
             <a:endParaRPr lang="en-US"/>
           </a:p>
@@ -588,7 +593,7 @@
           <a:p>
             <a:fld id="{148E3385-EF55-40F7-BBE9-92DC08C2CB6F}" type="datetimeFigureOut">
               <a:rPr lang="en-US" smtClean="0"/>
-              <a:t>4/12/2019</a:t>
+              <a:t>4/17/2019</a:t>
             </a:fld>
             <a:endParaRPr lang="en-US"/>
           </a:p>
@@ -758,7 +763,7 @@
           <a:p>
             <a:fld id="{148E3385-EF55-40F7-BBE9-92DC08C2CB6F}" type="datetimeFigureOut">
               <a:rPr lang="en-US" smtClean="0"/>
-              <a:t>4/12/2019</a:t>
+              <a:t>4/17/2019</a:t>
             </a:fld>
             <a:endParaRPr lang="en-US"/>
           </a:p>
@@ -1004,7 +1009,7 @@
           <a:p>
             <a:fld id="{148E3385-EF55-40F7-BBE9-92DC08C2CB6F}" type="datetimeFigureOut">
               <a:rPr lang="en-US" smtClean="0"/>
-              <a:t>4/12/2019</a:t>
+              <a:t>4/17/2019</a:t>
             </a:fld>
             <a:endParaRPr lang="en-US"/>
           </a:p>
@@ -1236,7 +1241,7 @@
           <a:p>
             <a:fld id="{148E3385-EF55-40F7-BBE9-92DC08C2CB6F}" type="datetimeFigureOut">
               <a:rPr lang="en-US" smtClean="0"/>
-              <a:t>4/12/2019</a:t>
+              <a:t>4/17/2019</a:t>
             </a:fld>
             <a:endParaRPr lang="en-US"/>
           </a:p>
@@ -1603,7 +1608,7 @@
           <a:p>
             <a:fld id="{148E3385-EF55-40F7-BBE9-92DC08C2CB6F}" type="datetimeFigureOut">
               <a:rPr lang="en-US" smtClean="0"/>
-              <a:t>4/12/2019</a:t>
+              <a:t>4/17/2019</a:t>
             </a:fld>
             <a:endParaRPr lang="en-US"/>
           </a:p>
@@ -1721,7 +1726,7 @@
           <a:p>
             <a:fld id="{148E3385-EF55-40F7-BBE9-92DC08C2CB6F}" type="datetimeFigureOut">
               <a:rPr lang="en-US" smtClean="0"/>
-              <a:t>4/12/2019</a:t>
+              <a:t>4/17/2019</a:t>
             </a:fld>
             <a:endParaRPr lang="en-US"/>
           </a:p>
@@ -1816,7 +1821,7 @@
           <a:p>
             <a:fld id="{148E3385-EF55-40F7-BBE9-92DC08C2CB6F}" type="datetimeFigureOut">
               <a:rPr lang="en-US" smtClean="0"/>
-              <a:t>4/12/2019</a:t>
+              <a:t>4/17/2019</a:t>
             </a:fld>
             <a:endParaRPr lang="en-US"/>
           </a:p>
@@ -2093,7 +2098,7 @@
           <a:p>
             <a:fld id="{148E3385-EF55-40F7-BBE9-92DC08C2CB6F}" type="datetimeFigureOut">
               <a:rPr lang="en-US" smtClean="0"/>
-              <a:t>4/12/2019</a:t>
+              <a:t>4/17/2019</a:t>
             </a:fld>
             <a:endParaRPr lang="en-US"/>
           </a:p>
@@ -2346,7 +2351,7 @@
           <a:p>
             <a:fld id="{148E3385-EF55-40F7-BBE9-92DC08C2CB6F}" type="datetimeFigureOut">
               <a:rPr lang="en-US" smtClean="0"/>
-              <a:t>4/12/2019</a:t>
+              <a:t>4/17/2019</a:t>
             </a:fld>
             <a:endParaRPr lang="en-US"/>
           </a:p>
@@ -2559,7 +2564,7 @@
           <a:p>
             <a:fld id="{148E3385-EF55-40F7-BBE9-92DC08C2CB6F}" type="datetimeFigureOut">
               <a:rPr lang="en-US" smtClean="0"/>
-              <a:t>4/12/2019</a:t>
+              <a:t>4/17/2019</a:t>
             </a:fld>
             <a:endParaRPr lang="en-US"/>
           </a:p>
@@ -3008,6 +3013,1407 @@
           </a:p>
         </p:txBody>
       </p:sp>
+      <p:sp>
+        <p:nvSpPr>
+          <p:cNvPr id="3" name="Rectangle 2"/>
+          <p:cNvSpPr/>
+          <p:nvPr/>
+        </p:nvSpPr>
+        <p:spPr>
+          <a:xfrm>
+            <a:off x="3630745" y="1620983"/>
+            <a:ext cx="3836857" cy="4281055"/>
+          </a:xfrm>
+          <a:prstGeom prst="rect">
+            <a:avLst/>
+          </a:prstGeom>
+          <a:solidFill>
+            <a:schemeClr val="accent1">
+              <a:lumMod val="20000"/>
+              <a:lumOff val="80000"/>
+            </a:schemeClr>
+          </a:solidFill>
+          <a:ln>
+            <a:solidFill>
+              <a:schemeClr val="accent1">
+                <a:lumMod val="50000"/>
+              </a:schemeClr>
+            </a:solidFill>
+          </a:ln>
+        </p:spPr>
+        <p:style>
+          <a:lnRef idx="2">
+            <a:schemeClr val="accent1">
+              <a:shade val="50000"/>
+            </a:schemeClr>
+          </a:lnRef>
+          <a:fillRef idx="1">
+            <a:schemeClr val="accent1"/>
+          </a:fillRef>
+          <a:effectRef idx="0">
+            <a:schemeClr val="accent1"/>
+          </a:effectRef>
+          <a:fontRef idx="minor">
+            <a:schemeClr val="lt1"/>
+          </a:fontRef>
+        </p:style>
+        <p:txBody>
+          <a:bodyPr rtlCol="0" anchor="ctr"/>
+          <a:lstStyle/>
+          <a:p>
+            <a:pPr algn="ctr"/>
+            <a:endParaRPr lang="en-US" b="1" dirty="0"/>
+          </a:p>
+        </p:txBody>
+      </p:sp>
+      <p:sp>
+        <p:nvSpPr>
+          <p:cNvPr id="4" name="Can 3"/>
+          <p:cNvSpPr/>
+          <p:nvPr/>
+        </p:nvSpPr>
+        <p:spPr>
+          <a:xfrm>
+            <a:off x="8356593" y="2434666"/>
+            <a:ext cx="1640591" cy="1689402"/>
+          </a:xfrm>
+          <a:prstGeom prst="can">
+            <a:avLst/>
+          </a:prstGeom>
+          <a:solidFill>
+            <a:schemeClr val="bg2">
+              <a:lumMod val="90000"/>
+            </a:schemeClr>
+          </a:solidFill>
+          <a:ln>
+            <a:solidFill>
+              <a:schemeClr val="bg2">
+                <a:lumMod val="25000"/>
+              </a:schemeClr>
+            </a:solidFill>
+          </a:ln>
+        </p:spPr>
+        <p:style>
+          <a:lnRef idx="2">
+            <a:schemeClr val="accent1">
+              <a:shade val="50000"/>
+            </a:schemeClr>
+          </a:lnRef>
+          <a:fillRef idx="1">
+            <a:schemeClr val="accent1"/>
+          </a:fillRef>
+          <a:effectRef idx="0">
+            <a:schemeClr val="accent1"/>
+          </a:effectRef>
+          <a:fontRef idx="minor">
+            <a:schemeClr val="lt1"/>
+          </a:fontRef>
+        </p:style>
+        <p:txBody>
+          <a:bodyPr rtlCol="0" anchor="ctr"/>
+          <a:lstStyle/>
+          <a:p>
+            <a:pPr algn="ctr"/>
+            <a:endParaRPr lang="en-US"/>
+          </a:p>
+        </p:txBody>
+      </p:sp>
+      <p:sp>
+        <p:nvSpPr>
+          <p:cNvPr id="6" name="Rectangle 5"/>
+          <p:cNvSpPr/>
+          <p:nvPr/>
+        </p:nvSpPr>
+        <p:spPr>
+          <a:xfrm>
+            <a:off x="8356593" y="4692216"/>
+            <a:ext cx="1640591" cy="1209822"/>
+          </a:xfrm>
+          <a:prstGeom prst="rect">
+            <a:avLst/>
+          </a:prstGeom>
+          <a:solidFill>
+            <a:schemeClr val="accent4">
+              <a:lumMod val="40000"/>
+              <a:lumOff val="60000"/>
+            </a:schemeClr>
+          </a:solidFill>
+          <a:ln>
+            <a:solidFill>
+              <a:schemeClr val="accent4">
+                <a:lumMod val="50000"/>
+              </a:schemeClr>
+            </a:solidFill>
+          </a:ln>
+        </p:spPr>
+        <p:style>
+          <a:lnRef idx="2">
+            <a:schemeClr val="accent1">
+              <a:shade val="50000"/>
+            </a:schemeClr>
+          </a:lnRef>
+          <a:fillRef idx="1">
+            <a:schemeClr val="accent1"/>
+          </a:fillRef>
+          <a:effectRef idx="0">
+            <a:schemeClr val="accent1"/>
+          </a:effectRef>
+          <a:fontRef idx="minor">
+            <a:schemeClr val="lt1"/>
+          </a:fontRef>
+        </p:style>
+        <p:txBody>
+          <a:bodyPr rtlCol="0" anchor="ctr"/>
+          <a:lstStyle/>
+          <a:p>
+            <a:pPr algn="ctr"/>
+            <a:endParaRPr lang="en-US" b="1" dirty="0"/>
+          </a:p>
+        </p:txBody>
+      </p:sp>
+      <p:sp>
+        <p:nvSpPr>
+          <p:cNvPr id="7" name="TextBox 6"/>
+          <p:cNvSpPr txBox="1"/>
+          <p:nvPr/>
+        </p:nvSpPr>
+        <p:spPr>
+          <a:xfrm>
+            <a:off x="8457180" y="3192604"/>
+            <a:ext cx="1494833" cy="830997"/>
+          </a:xfrm>
+          <a:prstGeom prst="rect">
+            <a:avLst/>
+          </a:prstGeom>
+          <a:noFill/>
+        </p:spPr>
+        <p:txBody>
+          <a:bodyPr wrap="none" rtlCol="0">
+            <a:spAutoFit/>
+          </a:bodyPr>
+          <a:lstStyle/>
+          <a:p>
+            <a:pPr algn="ctr"/>
+            <a:r>
+              <a:rPr lang="en-US" sz="1600" dirty="0" smtClean="0"/>
+              <a:t>Persistent Store</a:t>
+            </a:r>
+          </a:p>
+          <a:p>
+            <a:pPr algn="ctr"/>
+            <a:r>
+              <a:rPr lang="en-US" sz="1600" dirty="0" smtClean="0"/>
+              <a:t>(Mongo DB)</a:t>
+            </a:r>
+            <a:endParaRPr lang="en-US" sz="1600" dirty="0"/>
+          </a:p>
+          <a:p>
+            <a:pPr algn="ctr"/>
+            <a:endParaRPr lang="en-US" sz="1600" dirty="0"/>
+          </a:p>
+        </p:txBody>
+      </p:sp>
+      <p:sp>
+        <p:nvSpPr>
+          <p:cNvPr id="8" name="TextBox 7"/>
+          <p:cNvSpPr txBox="1"/>
+          <p:nvPr/>
+        </p:nvSpPr>
+        <p:spPr>
+          <a:xfrm>
+            <a:off x="8369270" y="5033027"/>
+            <a:ext cx="1670650" cy="584775"/>
+          </a:xfrm>
+          <a:prstGeom prst="rect">
+            <a:avLst/>
+          </a:prstGeom>
+          <a:noFill/>
+        </p:spPr>
+        <p:txBody>
+          <a:bodyPr wrap="none" rtlCol="0">
+            <a:spAutoFit/>
+          </a:bodyPr>
+          <a:lstStyle/>
+          <a:p>
+            <a:pPr algn="ctr"/>
+            <a:r>
+              <a:rPr lang="en-US" sz="1600" dirty="0" smtClean="0"/>
+              <a:t>Messaging Queue</a:t>
+            </a:r>
+          </a:p>
+          <a:p>
+            <a:pPr algn="ctr"/>
+            <a:r>
+              <a:rPr lang="en-US" sz="1600" dirty="0" smtClean="0"/>
+              <a:t>(Rabbit MQ)</a:t>
+            </a:r>
+            <a:endParaRPr lang="en-US" sz="1600" dirty="0"/>
+          </a:p>
+        </p:txBody>
+      </p:sp>
+      <p:sp>
+        <p:nvSpPr>
+          <p:cNvPr id="9" name="TextBox 8"/>
+          <p:cNvSpPr txBox="1"/>
+          <p:nvPr/>
+        </p:nvSpPr>
+        <p:spPr>
+          <a:xfrm>
+            <a:off x="3541542" y="1297845"/>
+            <a:ext cx="1271438" cy="584775"/>
+          </a:xfrm>
+          <a:prstGeom prst="rect">
+            <a:avLst/>
+          </a:prstGeom>
+          <a:noFill/>
+        </p:spPr>
+        <p:txBody>
+          <a:bodyPr wrap="none" rtlCol="0">
+            <a:spAutoFit/>
+          </a:bodyPr>
+          <a:lstStyle/>
+          <a:p>
+            <a:pPr algn="ctr"/>
+            <a:r>
+              <a:rPr lang="en-US" sz="1600" dirty="0" smtClean="0"/>
+              <a:t>Cache Server</a:t>
+            </a:r>
+          </a:p>
+          <a:p>
+            <a:pPr algn="ctr"/>
+            <a:endParaRPr lang="en-US" sz="1600" dirty="0"/>
+          </a:p>
+        </p:txBody>
+      </p:sp>
+      <p:sp>
+        <p:nvSpPr>
+          <p:cNvPr id="10" name="Rectangle 9"/>
+          <p:cNvSpPr/>
+          <p:nvPr/>
+        </p:nvSpPr>
+        <p:spPr>
+          <a:xfrm>
+            <a:off x="3784102" y="1747447"/>
+            <a:ext cx="3572663" cy="631475"/>
+          </a:xfrm>
+          <a:prstGeom prst="rect">
+            <a:avLst/>
+          </a:prstGeom>
+          <a:solidFill>
+            <a:schemeClr val="tx2">
+              <a:lumMod val="40000"/>
+              <a:lumOff val="60000"/>
+            </a:schemeClr>
+          </a:solidFill>
+        </p:spPr>
+        <p:style>
+          <a:lnRef idx="2">
+            <a:schemeClr val="accent1">
+              <a:shade val="50000"/>
+            </a:schemeClr>
+          </a:lnRef>
+          <a:fillRef idx="1">
+            <a:schemeClr val="accent1"/>
+          </a:fillRef>
+          <a:effectRef idx="0">
+            <a:schemeClr val="accent1"/>
+          </a:effectRef>
+          <a:fontRef idx="minor">
+            <a:schemeClr val="lt1"/>
+          </a:fontRef>
+        </p:style>
+        <p:txBody>
+          <a:bodyPr rtlCol="0" anchor="ctr"/>
+          <a:lstStyle/>
+          <a:p>
+            <a:pPr algn="ctr"/>
+            <a:endParaRPr lang="en-US"/>
+          </a:p>
+        </p:txBody>
+      </p:sp>
+      <p:sp>
+        <p:nvSpPr>
+          <p:cNvPr id="11" name="Rectangle 10"/>
+          <p:cNvSpPr/>
+          <p:nvPr/>
+        </p:nvSpPr>
+        <p:spPr>
+          <a:xfrm>
+            <a:off x="3784103" y="2547360"/>
+            <a:ext cx="731522" cy="3263625"/>
+          </a:xfrm>
+          <a:prstGeom prst="rect">
+            <a:avLst/>
+          </a:prstGeom>
+          <a:solidFill>
+            <a:schemeClr val="tx2">
+              <a:lumMod val="40000"/>
+              <a:lumOff val="60000"/>
+            </a:schemeClr>
+          </a:solidFill>
+        </p:spPr>
+        <p:style>
+          <a:lnRef idx="2">
+            <a:schemeClr val="accent1">
+              <a:shade val="50000"/>
+            </a:schemeClr>
+          </a:lnRef>
+          <a:fillRef idx="1">
+            <a:schemeClr val="accent1"/>
+          </a:fillRef>
+          <a:effectRef idx="0">
+            <a:schemeClr val="accent1"/>
+          </a:effectRef>
+          <a:fontRef idx="minor">
+            <a:schemeClr val="lt1"/>
+          </a:fontRef>
+        </p:style>
+        <p:txBody>
+          <a:bodyPr rtlCol="0" anchor="ctr"/>
+          <a:lstStyle/>
+          <a:p>
+            <a:pPr algn="ctr"/>
+            <a:endParaRPr lang="en-US"/>
+          </a:p>
+        </p:txBody>
+      </p:sp>
+      <p:sp>
+        <p:nvSpPr>
+          <p:cNvPr id="12" name="TextBox 11"/>
+          <p:cNvSpPr txBox="1"/>
+          <p:nvPr/>
+        </p:nvSpPr>
+        <p:spPr>
+          <a:xfrm>
+            <a:off x="4907550" y="1880910"/>
+            <a:ext cx="1481368" cy="584775"/>
+          </a:xfrm>
+          <a:prstGeom prst="rect">
+            <a:avLst/>
+          </a:prstGeom>
+          <a:noFill/>
+        </p:spPr>
+        <p:txBody>
+          <a:bodyPr wrap="none" rtlCol="0">
+            <a:spAutoFit/>
+          </a:bodyPr>
+          <a:lstStyle/>
+          <a:p>
+            <a:pPr algn="ctr"/>
+            <a:r>
+              <a:rPr lang="en-US" sz="1600" dirty="0" smtClean="0"/>
+              <a:t>Cache Manager</a:t>
+            </a:r>
+          </a:p>
+          <a:p>
+            <a:pPr algn="ctr"/>
+            <a:endParaRPr lang="en-US" sz="1600" dirty="0"/>
+          </a:p>
+        </p:txBody>
+      </p:sp>
+      <p:sp>
+        <p:nvSpPr>
+          <p:cNvPr id="13" name="TextBox 12"/>
+          <p:cNvSpPr txBox="1"/>
+          <p:nvPr/>
+        </p:nvSpPr>
+        <p:spPr>
+          <a:xfrm rot="5400000">
+            <a:off x="3584479" y="3834859"/>
+            <a:ext cx="1168910" cy="338554"/>
+          </a:xfrm>
+          <a:prstGeom prst="rect">
+            <a:avLst/>
+          </a:prstGeom>
+          <a:noFill/>
+        </p:spPr>
+        <p:txBody>
+          <a:bodyPr wrap="none" rtlCol="0">
+            <a:spAutoFit/>
+          </a:bodyPr>
+          <a:lstStyle/>
+          <a:p>
+            <a:pPr algn="ctr"/>
+            <a:r>
+              <a:rPr lang="en-US" sz="1600" dirty="0" smtClean="0"/>
+              <a:t>API Handler</a:t>
+            </a:r>
+            <a:endParaRPr lang="en-US" sz="1600" dirty="0"/>
+          </a:p>
+        </p:txBody>
+      </p:sp>
+      <p:sp>
+        <p:nvSpPr>
+          <p:cNvPr id="14" name="Rectangle 13"/>
+          <p:cNvSpPr/>
+          <p:nvPr/>
+        </p:nvSpPr>
+        <p:spPr>
+          <a:xfrm>
+            <a:off x="4668983" y="5171319"/>
+            <a:ext cx="1848713" cy="631475"/>
+          </a:xfrm>
+          <a:prstGeom prst="rect">
+            <a:avLst/>
+          </a:prstGeom>
+          <a:solidFill>
+            <a:schemeClr val="tx2">
+              <a:lumMod val="40000"/>
+              <a:lumOff val="60000"/>
+            </a:schemeClr>
+          </a:solidFill>
+        </p:spPr>
+        <p:style>
+          <a:lnRef idx="2">
+            <a:schemeClr val="accent1">
+              <a:shade val="50000"/>
+            </a:schemeClr>
+          </a:lnRef>
+          <a:fillRef idx="1">
+            <a:schemeClr val="accent1"/>
+          </a:fillRef>
+          <a:effectRef idx="0">
+            <a:schemeClr val="accent1"/>
+          </a:effectRef>
+          <a:fontRef idx="minor">
+            <a:schemeClr val="lt1"/>
+          </a:fontRef>
+        </p:style>
+        <p:txBody>
+          <a:bodyPr rtlCol="0" anchor="ctr"/>
+          <a:lstStyle/>
+          <a:p>
+            <a:pPr algn="ctr"/>
+            <a:endParaRPr lang="en-US"/>
+          </a:p>
+        </p:txBody>
+      </p:sp>
+      <p:sp>
+        <p:nvSpPr>
+          <p:cNvPr id="15" name="Folded Corner 14"/>
+          <p:cNvSpPr/>
+          <p:nvPr/>
+        </p:nvSpPr>
+        <p:spPr>
+          <a:xfrm>
+            <a:off x="5469642" y="5679124"/>
+            <a:ext cx="357184" cy="445827"/>
+          </a:xfrm>
+          <a:prstGeom prst="foldedCorner">
+            <a:avLst>
+              <a:gd name="adj" fmla="val 46546"/>
+            </a:avLst>
+          </a:prstGeom>
+          <a:solidFill>
+            <a:schemeClr val="bg1">
+              <a:lumMod val="95000"/>
+            </a:schemeClr>
+          </a:solidFill>
+        </p:spPr>
+        <p:style>
+          <a:lnRef idx="2">
+            <a:schemeClr val="accent1">
+              <a:shade val="50000"/>
+            </a:schemeClr>
+          </a:lnRef>
+          <a:fillRef idx="1">
+            <a:schemeClr val="accent1"/>
+          </a:fillRef>
+          <a:effectRef idx="0">
+            <a:schemeClr val="accent1"/>
+          </a:effectRef>
+          <a:fontRef idx="minor">
+            <a:schemeClr val="lt1"/>
+          </a:fontRef>
+        </p:style>
+        <p:txBody>
+          <a:bodyPr rtlCol="0" anchor="ctr"/>
+          <a:lstStyle/>
+          <a:p>
+            <a:pPr algn="ctr"/>
+            <a:endParaRPr lang="en-US"/>
+          </a:p>
+        </p:txBody>
+      </p:sp>
+      <p:sp>
+        <p:nvSpPr>
+          <p:cNvPr id="16" name="TextBox 15"/>
+          <p:cNvSpPr txBox="1"/>
+          <p:nvPr/>
+        </p:nvSpPr>
+        <p:spPr>
+          <a:xfrm>
+            <a:off x="4894534" y="5317263"/>
+            <a:ext cx="1507400" cy="584775"/>
+          </a:xfrm>
+          <a:prstGeom prst="rect">
+            <a:avLst/>
+          </a:prstGeom>
+          <a:noFill/>
+        </p:spPr>
+        <p:txBody>
+          <a:bodyPr wrap="none" rtlCol="0">
+            <a:spAutoFit/>
+          </a:bodyPr>
+          <a:lstStyle/>
+          <a:p>
+            <a:pPr algn="ctr"/>
+            <a:r>
+              <a:rPr lang="en-US" sz="1600" dirty="0" smtClean="0"/>
+              <a:t>Config Manager</a:t>
+            </a:r>
+          </a:p>
+          <a:p>
+            <a:pPr algn="ctr"/>
+            <a:endParaRPr lang="en-US" sz="1600" dirty="0"/>
+          </a:p>
+        </p:txBody>
+      </p:sp>
+      <p:sp>
+        <p:nvSpPr>
+          <p:cNvPr id="18" name="Rectangle 17"/>
+          <p:cNvSpPr/>
+          <p:nvPr/>
+        </p:nvSpPr>
+        <p:spPr>
+          <a:xfrm>
+            <a:off x="6625243" y="2519431"/>
+            <a:ext cx="731522" cy="1581909"/>
+          </a:xfrm>
+          <a:prstGeom prst="rect">
+            <a:avLst/>
+          </a:prstGeom>
+          <a:solidFill>
+            <a:schemeClr val="tx2">
+              <a:lumMod val="40000"/>
+              <a:lumOff val="60000"/>
+            </a:schemeClr>
+          </a:solidFill>
+        </p:spPr>
+        <p:style>
+          <a:lnRef idx="2">
+            <a:schemeClr val="accent1">
+              <a:shade val="50000"/>
+            </a:schemeClr>
+          </a:lnRef>
+          <a:fillRef idx="1">
+            <a:schemeClr val="accent1"/>
+          </a:fillRef>
+          <a:effectRef idx="0">
+            <a:schemeClr val="accent1"/>
+          </a:effectRef>
+          <a:fontRef idx="minor">
+            <a:schemeClr val="lt1"/>
+          </a:fontRef>
+        </p:style>
+        <p:txBody>
+          <a:bodyPr rtlCol="0" anchor="ctr"/>
+          <a:lstStyle/>
+          <a:p>
+            <a:pPr algn="ctr"/>
+            <a:endParaRPr lang="en-US"/>
+          </a:p>
+        </p:txBody>
+      </p:sp>
+      <p:sp>
+        <p:nvSpPr>
+          <p:cNvPr id="20" name="Rectangle 19"/>
+          <p:cNvSpPr/>
+          <p:nvPr/>
+        </p:nvSpPr>
+        <p:spPr>
+          <a:xfrm>
+            <a:off x="6626888" y="4229077"/>
+            <a:ext cx="731522" cy="1581909"/>
+          </a:xfrm>
+          <a:prstGeom prst="rect">
+            <a:avLst/>
+          </a:prstGeom>
+          <a:solidFill>
+            <a:schemeClr val="tx2">
+              <a:lumMod val="40000"/>
+              <a:lumOff val="60000"/>
+            </a:schemeClr>
+          </a:solidFill>
+        </p:spPr>
+        <p:style>
+          <a:lnRef idx="2">
+            <a:schemeClr val="accent1">
+              <a:shade val="50000"/>
+            </a:schemeClr>
+          </a:lnRef>
+          <a:fillRef idx="1">
+            <a:schemeClr val="accent1"/>
+          </a:fillRef>
+          <a:effectRef idx="0">
+            <a:schemeClr val="accent1"/>
+          </a:effectRef>
+          <a:fontRef idx="minor">
+            <a:schemeClr val="lt1"/>
+          </a:fontRef>
+        </p:style>
+        <p:txBody>
+          <a:bodyPr rtlCol="0" anchor="ctr"/>
+          <a:lstStyle/>
+          <a:p>
+            <a:pPr algn="ctr"/>
+            <a:endParaRPr lang="en-US"/>
+          </a:p>
+        </p:txBody>
+      </p:sp>
+      <p:sp>
+        <p:nvSpPr>
+          <p:cNvPr id="21" name="TextBox 20"/>
+          <p:cNvSpPr txBox="1"/>
+          <p:nvPr/>
+        </p:nvSpPr>
+        <p:spPr>
+          <a:xfrm>
+            <a:off x="5082662" y="6115580"/>
+            <a:ext cx="1131143" cy="584775"/>
+          </a:xfrm>
+          <a:prstGeom prst="rect">
+            <a:avLst/>
+          </a:prstGeom>
+          <a:noFill/>
+        </p:spPr>
+        <p:txBody>
+          <a:bodyPr wrap="none" rtlCol="0">
+            <a:spAutoFit/>
+          </a:bodyPr>
+          <a:lstStyle/>
+          <a:p>
+            <a:pPr algn="ctr"/>
+            <a:r>
+              <a:rPr lang="en-US" sz="1600" dirty="0"/>
+              <a:t>c</a:t>
+            </a:r>
+            <a:r>
+              <a:rPr lang="en-US" sz="1600" dirty="0" smtClean="0"/>
+              <a:t>onfig.yaml</a:t>
+            </a:r>
+          </a:p>
+          <a:p>
+            <a:pPr algn="ctr"/>
+            <a:endParaRPr lang="en-US" sz="1600" dirty="0"/>
+          </a:p>
+        </p:txBody>
+      </p:sp>
+      <p:sp>
+        <p:nvSpPr>
+          <p:cNvPr id="22" name="TextBox 21"/>
+          <p:cNvSpPr txBox="1"/>
+          <p:nvPr/>
+        </p:nvSpPr>
+        <p:spPr>
+          <a:xfrm rot="5400000">
+            <a:off x="6415168" y="3172738"/>
+            <a:ext cx="1216873" cy="338554"/>
+          </a:xfrm>
+          <a:prstGeom prst="rect">
+            <a:avLst/>
+          </a:prstGeom>
+          <a:noFill/>
+        </p:spPr>
+        <p:txBody>
+          <a:bodyPr wrap="none" rtlCol="0">
+            <a:spAutoFit/>
+          </a:bodyPr>
+          <a:lstStyle/>
+          <a:p>
+            <a:pPr algn="ctr"/>
+            <a:r>
+              <a:rPr lang="en-US" sz="1600" dirty="0" smtClean="0"/>
+              <a:t>DB Manager</a:t>
+            </a:r>
+            <a:endParaRPr lang="en-US" sz="1600" dirty="0"/>
+          </a:p>
+        </p:txBody>
+      </p:sp>
+      <p:sp>
+        <p:nvSpPr>
+          <p:cNvPr id="23" name="TextBox 22"/>
+          <p:cNvSpPr txBox="1"/>
+          <p:nvPr/>
+        </p:nvSpPr>
+        <p:spPr>
+          <a:xfrm rot="5400000">
+            <a:off x="6378298" y="4850754"/>
+            <a:ext cx="1290611" cy="338554"/>
+          </a:xfrm>
+          <a:prstGeom prst="rect">
+            <a:avLst/>
+          </a:prstGeom>
+          <a:noFill/>
+        </p:spPr>
+        <p:txBody>
+          <a:bodyPr wrap="none" rtlCol="0">
+            <a:spAutoFit/>
+          </a:bodyPr>
+          <a:lstStyle/>
+          <a:p>
+            <a:pPr algn="ctr"/>
+            <a:r>
+              <a:rPr lang="en-US" sz="1600" dirty="0" smtClean="0"/>
+              <a:t>MQ Manager</a:t>
+            </a:r>
+            <a:endParaRPr lang="en-US" sz="1600" dirty="0"/>
+          </a:p>
+        </p:txBody>
+      </p:sp>
+      <p:cxnSp>
+        <p:nvCxnSpPr>
+          <p:cNvPr id="26" name="Straight Arrow Connector 25"/>
+          <p:cNvCxnSpPr/>
+          <p:nvPr/>
+        </p:nvCxnSpPr>
+        <p:spPr>
+          <a:xfrm>
+            <a:off x="7454925" y="5171319"/>
+            <a:ext cx="901668" cy="0"/>
+          </a:xfrm>
+          <a:prstGeom prst="straightConnector1">
+            <a:avLst/>
+          </a:prstGeom>
+          <a:ln w="31750">
+            <a:solidFill>
+              <a:schemeClr val="accent5">
+                <a:lumMod val="75000"/>
+              </a:schemeClr>
+            </a:solidFill>
+            <a:headEnd type="triangle"/>
+            <a:tailEnd type="triangle"/>
+          </a:ln>
+        </p:spPr>
+        <p:style>
+          <a:lnRef idx="1">
+            <a:schemeClr val="accent1"/>
+          </a:lnRef>
+          <a:fillRef idx="0">
+            <a:schemeClr val="accent1"/>
+          </a:fillRef>
+          <a:effectRef idx="0">
+            <a:schemeClr val="accent1"/>
+          </a:effectRef>
+          <a:fontRef idx="minor">
+            <a:schemeClr val="tx1"/>
+          </a:fontRef>
+        </p:style>
+      </p:cxnSp>
+      <p:cxnSp>
+        <p:nvCxnSpPr>
+          <p:cNvPr id="27" name="Straight Arrow Connector 26"/>
+          <p:cNvCxnSpPr/>
+          <p:nvPr/>
+        </p:nvCxnSpPr>
+        <p:spPr>
+          <a:xfrm>
+            <a:off x="7454925" y="3192604"/>
+            <a:ext cx="901668" cy="0"/>
+          </a:xfrm>
+          <a:prstGeom prst="straightConnector1">
+            <a:avLst/>
+          </a:prstGeom>
+          <a:ln w="31750">
+            <a:solidFill>
+              <a:schemeClr val="accent5">
+                <a:lumMod val="75000"/>
+              </a:schemeClr>
+            </a:solidFill>
+            <a:headEnd type="triangle"/>
+            <a:tailEnd type="triangle"/>
+          </a:ln>
+        </p:spPr>
+        <p:style>
+          <a:lnRef idx="1">
+            <a:schemeClr val="accent1"/>
+          </a:lnRef>
+          <a:fillRef idx="0">
+            <a:schemeClr val="accent1"/>
+          </a:fillRef>
+          <a:effectRef idx="0">
+            <a:schemeClr val="accent1"/>
+          </a:effectRef>
+          <a:fontRef idx="minor">
+            <a:schemeClr val="tx1"/>
+          </a:fontRef>
+        </p:style>
+      </p:cxnSp>
+      <p:cxnSp>
+        <p:nvCxnSpPr>
+          <p:cNvPr id="29" name="Straight Arrow Connector 28"/>
+          <p:cNvCxnSpPr/>
+          <p:nvPr/>
+        </p:nvCxnSpPr>
+        <p:spPr>
+          <a:xfrm flipH="1">
+            <a:off x="2202875" y="2761287"/>
+            <a:ext cx="1581227" cy="0"/>
+          </a:xfrm>
+          <a:prstGeom prst="straightConnector1">
+            <a:avLst/>
+          </a:prstGeom>
+          <a:ln w="12700">
+            <a:solidFill>
+              <a:schemeClr val="accent1">
+                <a:lumMod val="75000"/>
+              </a:schemeClr>
+            </a:solidFill>
+            <a:tailEnd type="triangle"/>
+          </a:ln>
+        </p:spPr>
+        <p:style>
+          <a:lnRef idx="1">
+            <a:schemeClr val="accent1"/>
+          </a:lnRef>
+          <a:fillRef idx="0">
+            <a:schemeClr val="accent1"/>
+          </a:fillRef>
+          <a:effectRef idx="0">
+            <a:schemeClr val="accent1"/>
+          </a:effectRef>
+          <a:fontRef idx="minor">
+            <a:schemeClr val="tx1"/>
+          </a:fontRef>
+        </p:style>
+      </p:cxnSp>
+      <p:cxnSp>
+        <p:nvCxnSpPr>
+          <p:cNvPr id="30" name="Straight Arrow Connector 29"/>
+          <p:cNvCxnSpPr/>
+          <p:nvPr/>
+        </p:nvCxnSpPr>
+        <p:spPr>
+          <a:xfrm flipH="1">
+            <a:off x="2202875" y="3576999"/>
+            <a:ext cx="1581227" cy="0"/>
+          </a:xfrm>
+          <a:prstGeom prst="straightConnector1">
+            <a:avLst/>
+          </a:prstGeom>
+          <a:ln w="12700">
+            <a:solidFill>
+              <a:schemeClr val="accent1">
+                <a:lumMod val="75000"/>
+              </a:schemeClr>
+            </a:solidFill>
+            <a:tailEnd type="triangle"/>
+          </a:ln>
+        </p:spPr>
+        <p:style>
+          <a:lnRef idx="1">
+            <a:schemeClr val="accent1"/>
+          </a:lnRef>
+          <a:fillRef idx="0">
+            <a:schemeClr val="accent1"/>
+          </a:fillRef>
+          <a:effectRef idx="0">
+            <a:schemeClr val="accent1"/>
+          </a:effectRef>
+          <a:fontRef idx="minor">
+            <a:schemeClr val="tx1"/>
+          </a:fontRef>
+        </p:style>
+      </p:cxnSp>
+      <p:cxnSp>
+        <p:nvCxnSpPr>
+          <p:cNvPr id="31" name="Straight Arrow Connector 30"/>
+          <p:cNvCxnSpPr/>
+          <p:nvPr/>
+        </p:nvCxnSpPr>
+        <p:spPr>
+          <a:xfrm flipH="1">
+            <a:off x="2202875" y="4374725"/>
+            <a:ext cx="1581227" cy="0"/>
+          </a:xfrm>
+          <a:prstGeom prst="straightConnector1">
+            <a:avLst/>
+          </a:prstGeom>
+          <a:ln w="12700">
+            <a:solidFill>
+              <a:schemeClr val="accent1">
+                <a:lumMod val="75000"/>
+              </a:schemeClr>
+            </a:solidFill>
+            <a:tailEnd type="triangle"/>
+          </a:ln>
+        </p:spPr>
+        <p:style>
+          <a:lnRef idx="1">
+            <a:schemeClr val="accent1"/>
+          </a:lnRef>
+          <a:fillRef idx="0">
+            <a:schemeClr val="accent1"/>
+          </a:fillRef>
+          <a:effectRef idx="0">
+            <a:schemeClr val="accent1"/>
+          </a:effectRef>
+          <a:fontRef idx="minor">
+            <a:schemeClr val="tx1"/>
+          </a:fontRef>
+        </p:style>
+      </p:cxnSp>
+      <p:cxnSp>
+        <p:nvCxnSpPr>
+          <p:cNvPr id="32" name="Straight Arrow Connector 31"/>
+          <p:cNvCxnSpPr/>
+          <p:nvPr/>
+        </p:nvCxnSpPr>
+        <p:spPr>
+          <a:xfrm flipH="1">
+            <a:off x="2202875" y="5286241"/>
+            <a:ext cx="1581227" cy="0"/>
+          </a:xfrm>
+          <a:prstGeom prst="straightConnector1">
+            <a:avLst/>
+          </a:prstGeom>
+          <a:ln w="12700">
+            <a:solidFill>
+              <a:schemeClr val="accent1">
+                <a:lumMod val="75000"/>
+              </a:schemeClr>
+            </a:solidFill>
+            <a:tailEnd type="triangle"/>
+          </a:ln>
+        </p:spPr>
+        <p:style>
+          <a:lnRef idx="1">
+            <a:schemeClr val="accent1"/>
+          </a:lnRef>
+          <a:fillRef idx="0">
+            <a:schemeClr val="accent1"/>
+          </a:fillRef>
+          <a:effectRef idx="0">
+            <a:schemeClr val="accent1"/>
+          </a:effectRef>
+          <a:fontRef idx="minor">
+            <a:schemeClr val="tx1"/>
+          </a:fontRef>
+        </p:style>
+      </p:cxnSp>
+      <p:sp>
+        <p:nvSpPr>
+          <p:cNvPr id="33" name="TextBox 32"/>
+          <p:cNvSpPr txBox="1"/>
+          <p:nvPr/>
+        </p:nvSpPr>
+        <p:spPr>
+          <a:xfrm>
+            <a:off x="1718299" y="2493046"/>
+            <a:ext cx="1719766" cy="553998"/>
+          </a:xfrm>
+          <a:prstGeom prst="rect">
+            <a:avLst/>
+          </a:prstGeom>
+          <a:noFill/>
+        </p:spPr>
+        <p:txBody>
+          <a:bodyPr wrap="none" rtlCol="0">
+            <a:spAutoFit/>
+          </a:bodyPr>
+          <a:lstStyle/>
+          <a:p>
+            <a:r>
+              <a:rPr lang="en-US" sz="1400" dirty="0" smtClean="0"/>
+              <a:t>Add Data (Employee</a:t>
+            </a:r>
+            <a:r>
+              <a:rPr lang="en-US" sz="1200" dirty="0" smtClean="0"/>
+              <a:t>)</a:t>
+            </a:r>
+          </a:p>
+          <a:p>
+            <a:pPr algn="ctr"/>
+            <a:endParaRPr lang="en-US" sz="1600" dirty="0"/>
+          </a:p>
+        </p:txBody>
+      </p:sp>
+      <p:sp>
+        <p:nvSpPr>
+          <p:cNvPr id="34" name="TextBox 33"/>
+          <p:cNvSpPr txBox="1"/>
+          <p:nvPr/>
+        </p:nvSpPr>
+        <p:spPr>
+          <a:xfrm>
+            <a:off x="1718299" y="3308356"/>
+            <a:ext cx="1697965" cy="584775"/>
+          </a:xfrm>
+          <a:prstGeom prst="rect">
+            <a:avLst/>
+          </a:prstGeom>
+          <a:noFill/>
+        </p:spPr>
+        <p:txBody>
+          <a:bodyPr wrap="none" rtlCol="0">
+            <a:spAutoFit/>
+          </a:bodyPr>
+          <a:lstStyle/>
+          <a:p>
+            <a:r>
+              <a:rPr lang="en-US" sz="1400" dirty="0" smtClean="0"/>
+              <a:t>Get Data (Employee)</a:t>
+            </a:r>
+          </a:p>
+          <a:p>
+            <a:endParaRPr lang="en-US" dirty="0"/>
+          </a:p>
+        </p:txBody>
+      </p:sp>
+      <p:sp>
+        <p:nvSpPr>
+          <p:cNvPr id="35" name="TextBox 34"/>
+          <p:cNvSpPr txBox="1"/>
+          <p:nvPr/>
+        </p:nvSpPr>
+        <p:spPr>
+          <a:xfrm>
+            <a:off x="1668059" y="4124068"/>
+            <a:ext cx="1763880" cy="523220"/>
+          </a:xfrm>
+          <a:prstGeom prst="rect">
+            <a:avLst/>
+          </a:prstGeom>
+          <a:noFill/>
+        </p:spPr>
+        <p:txBody>
+          <a:bodyPr wrap="none" rtlCol="0">
+            <a:spAutoFit/>
+          </a:bodyPr>
+          <a:lstStyle/>
+          <a:p>
+            <a:pPr algn="ctr"/>
+            <a:r>
+              <a:rPr lang="en-US" sz="1400" dirty="0" smtClean="0"/>
+              <a:t>Get List by Pagination</a:t>
+            </a:r>
+          </a:p>
+          <a:p>
+            <a:pPr algn="ctr"/>
+            <a:endParaRPr lang="en-US" sz="1400" dirty="0"/>
+          </a:p>
+        </p:txBody>
+      </p:sp>
+      <p:sp>
+        <p:nvSpPr>
+          <p:cNvPr id="36" name="TextBox 35"/>
+          <p:cNvSpPr txBox="1"/>
+          <p:nvPr/>
+        </p:nvSpPr>
+        <p:spPr>
+          <a:xfrm>
+            <a:off x="1718299" y="5034785"/>
+            <a:ext cx="1299074" cy="307777"/>
+          </a:xfrm>
+          <a:prstGeom prst="rect">
+            <a:avLst/>
+          </a:prstGeom>
+          <a:noFill/>
+        </p:spPr>
+        <p:txBody>
+          <a:bodyPr wrap="none" rtlCol="0">
+            <a:spAutoFit/>
+          </a:bodyPr>
+          <a:lstStyle/>
+          <a:p>
+            <a:pPr algn="ctr"/>
+            <a:r>
+              <a:rPr lang="en-US" sz="1400" dirty="0" smtClean="0"/>
+              <a:t>Reload(Trigger)</a:t>
+            </a:r>
+            <a:endParaRPr lang="en-US" dirty="0"/>
+          </a:p>
+        </p:txBody>
+      </p:sp>
+      <p:sp>
+        <p:nvSpPr>
+          <p:cNvPr id="44" name="TextBox 43"/>
+          <p:cNvSpPr txBox="1"/>
+          <p:nvPr/>
+        </p:nvSpPr>
+        <p:spPr>
+          <a:xfrm>
+            <a:off x="5014573" y="4504226"/>
+            <a:ext cx="1167820" cy="307777"/>
+          </a:xfrm>
+          <a:prstGeom prst="rect">
+            <a:avLst/>
+          </a:prstGeom>
+          <a:noFill/>
+        </p:spPr>
+        <p:txBody>
+          <a:bodyPr wrap="none" rtlCol="0">
+            <a:spAutoFit/>
+          </a:bodyPr>
+          <a:lstStyle/>
+          <a:p>
+            <a:pPr algn="ctr"/>
+            <a:r>
+              <a:rPr lang="en-US" sz="1400" dirty="0" smtClean="0"/>
+              <a:t>Publish event</a:t>
+            </a:r>
+            <a:endParaRPr lang="en-US" sz="1400" dirty="0"/>
+          </a:p>
+        </p:txBody>
+      </p:sp>
+      <p:cxnSp>
+        <p:nvCxnSpPr>
+          <p:cNvPr id="49" name="Straight Arrow Connector 48"/>
+          <p:cNvCxnSpPr/>
+          <p:nvPr/>
+        </p:nvCxnSpPr>
+        <p:spPr>
+          <a:xfrm>
+            <a:off x="4508952" y="3626490"/>
+            <a:ext cx="2109618" cy="0"/>
+          </a:xfrm>
+          <a:prstGeom prst="straightConnector1">
+            <a:avLst/>
+          </a:prstGeom>
+          <a:ln>
+            <a:headEnd type="triangle"/>
+            <a:tailEnd type="triangle"/>
+          </a:ln>
+        </p:spPr>
+        <p:style>
+          <a:lnRef idx="1">
+            <a:schemeClr val="accent1"/>
+          </a:lnRef>
+          <a:fillRef idx="0">
+            <a:schemeClr val="accent1"/>
+          </a:fillRef>
+          <a:effectRef idx="0">
+            <a:schemeClr val="accent1"/>
+          </a:effectRef>
+          <a:fontRef idx="minor">
+            <a:schemeClr val="tx1"/>
+          </a:fontRef>
+        </p:style>
+      </p:cxnSp>
+      <p:cxnSp>
+        <p:nvCxnSpPr>
+          <p:cNvPr id="50" name="Straight Arrow Connector 49"/>
+          <p:cNvCxnSpPr/>
+          <p:nvPr/>
+        </p:nvCxnSpPr>
+        <p:spPr>
+          <a:xfrm>
+            <a:off x="4521740" y="4853625"/>
+            <a:ext cx="2109618" cy="0"/>
+          </a:xfrm>
+          <a:prstGeom prst="straightConnector1">
+            <a:avLst/>
+          </a:prstGeom>
+          <a:ln>
+            <a:headEnd type="triangle"/>
+            <a:tailEnd type="triangle"/>
+          </a:ln>
+        </p:spPr>
+        <p:style>
+          <a:lnRef idx="1">
+            <a:schemeClr val="accent1"/>
+          </a:lnRef>
+          <a:fillRef idx="0">
+            <a:schemeClr val="accent1"/>
+          </a:fillRef>
+          <a:effectRef idx="0">
+            <a:schemeClr val="accent1"/>
+          </a:effectRef>
+          <a:fontRef idx="minor">
+            <a:schemeClr val="tx1"/>
+          </a:fontRef>
+        </p:style>
+      </p:cxnSp>
+      <p:sp>
+        <p:nvSpPr>
+          <p:cNvPr id="51" name="TextBox 50"/>
+          <p:cNvSpPr txBox="1"/>
+          <p:nvPr/>
+        </p:nvSpPr>
+        <p:spPr>
+          <a:xfrm>
+            <a:off x="4940338" y="4821919"/>
+            <a:ext cx="1341650" cy="307777"/>
+          </a:xfrm>
+          <a:prstGeom prst="rect">
+            <a:avLst/>
+          </a:prstGeom>
+          <a:noFill/>
+        </p:spPr>
+        <p:txBody>
+          <a:bodyPr wrap="none" rtlCol="0">
+            <a:spAutoFit/>
+          </a:bodyPr>
+          <a:lstStyle/>
+          <a:p>
+            <a:pPr algn="ctr"/>
+            <a:r>
+              <a:rPr lang="en-US" sz="1400" dirty="0" smtClean="0"/>
+              <a:t>Subscribe event</a:t>
+            </a:r>
+            <a:endParaRPr lang="en-US" sz="1400" dirty="0"/>
+          </a:p>
+        </p:txBody>
+      </p:sp>
+      <p:sp>
+        <p:nvSpPr>
+          <p:cNvPr id="54" name="TextBox 53"/>
+          <p:cNvSpPr txBox="1"/>
+          <p:nvPr/>
+        </p:nvSpPr>
+        <p:spPr>
+          <a:xfrm>
+            <a:off x="5163160" y="3328630"/>
+            <a:ext cx="934936" cy="307777"/>
+          </a:xfrm>
+          <a:prstGeom prst="rect">
+            <a:avLst/>
+          </a:prstGeom>
+          <a:noFill/>
+        </p:spPr>
+        <p:txBody>
+          <a:bodyPr wrap="none" rtlCol="0">
+            <a:spAutoFit/>
+          </a:bodyPr>
+          <a:lstStyle/>
+          <a:p>
+            <a:pPr algn="ctr"/>
+            <a:r>
+              <a:rPr lang="en-US" sz="1400" dirty="0" smtClean="0"/>
+              <a:t>Store data</a:t>
+            </a:r>
+            <a:endParaRPr lang="en-US" sz="1400" dirty="0"/>
+          </a:p>
+        </p:txBody>
+      </p:sp>
+      <p:sp>
+        <p:nvSpPr>
+          <p:cNvPr id="55" name="TextBox 54"/>
+          <p:cNvSpPr txBox="1"/>
+          <p:nvPr/>
+        </p:nvSpPr>
+        <p:spPr>
+          <a:xfrm>
+            <a:off x="5171074" y="3621045"/>
+            <a:ext cx="813043" cy="307777"/>
+          </a:xfrm>
+          <a:prstGeom prst="rect">
+            <a:avLst/>
+          </a:prstGeom>
+          <a:noFill/>
+        </p:spPr>
+        <p:txBody>
+          <a:bodyPr wrap="none" rtlCol="0">
+            <a:spAutoFit/>
+          </a:bodyPr>
+          <a:lstStyle/>
+          <a:p>
+            <a:pPr algn="ctr"/>
+            <a:r>
+              <a:rPr lang="en-US" sz="1400" dirty="0" smtClean="0"/>
+              <a:t>Get data</a:t>
+            </a:r>
+            <a:endParaRPr lang="en-US" sz="1400" dirty="0"/>
+          </a:p>
+        </p:txBody>
+      </p:sp>
+      <p:cxnSp>
+        <p:nvCxnSpPr>
+          <p:cNvPr id="57" name="Elbow Connector 56"/>
+          <p:cNvCxnSpPr>
+            <a:endCxn id="12" idx="2"/>
+          </p:cNvCxnSpPr>
+          <p:nvPr/>
+        </p:nvCxnSpPr>
+        <p:spPr>
+          <a:xfrm flipV="1">
+            <a:off x="4515625" y="2465685"/>
+            <a:ext cx="1132609" cy="471480"/>
+          </a:xfrm>
+          <a:prstGeom prst="bentConnector2">
+            <a:avLst/>
+          </a:prstGeom>
+          <a:ln>
+            <a:tailEnd type="triangle"/>
+          </a:ln>
+        </p:spPr>
+        <p:style>
+          <a:lnRef idx="1">
+            <a:schemeClr val="accent1"/>
+          </a:lnRef>
+          <a:fillRef idx="0">
+            <a:schemeClr val="accent1"/>
+          </a:fillRef>
+          <a:effectRef idx="0">
+            <a:schemeClr val="accent1"/>
+          </a:effectRef>
+          <a:fontRef idx="minor">
+            <a:schemeClr val="tx1"/>
+          </a:fontRef>
+        </p:style>
+      </p:cxnSp>
+      <p:sp>
+        <p:nvSpPr>
+          <p:cNvPr id="58" name="TextBox 57"/>
+          <p:cNvSpPr txBox="1"/>
+          <p:nvPr/>
+        </p:nvSpPr>
+        <p:spPr>
+          <a:xfrm>
+            <a:off x="5630424" y="2663685"/>
+            <a:ext cx="702565" cy="307777"/>
+          </a:xfrm>
+          <a:prstGeom prst="rect">
+            <a:avLst/>
+          </a:prstGeom>
+          <a:noFill/>
+        </p:spPr>
+        <p:txBody>
+          <a:bodyPr wrap="none" rtlCol="0">
+            <a:spAutoFit/>
+          </a:bodyPr>
+          <a:lstStyle/>
+          <a:p>
+            <a:pPr algn="ctr"/>
+            <a:r>
+              <a:rPr lang="en-US" sz="1400" dirty="0" smtClean="0"/>
+              <a:t>Set key</a:t>
+            </a:r>
+            <a:endParaRPr lang="en-US" sz="1400" dirty="0"/>
+          </a:p>
+        </p:txBody>
+      </p:sp>
+      <p:sp>
+        <p:nvSpPr>
+          <p:cNvPr id="59" name="TextBox 58"/>
+          <p:cNvSpPr txBox="1"/>
+          <p:nvPr/>
+        </p:nvSpPr>
+        <p:spPr>
+          <a:xfrm>
+            <a:off x="4953656" y="2649361"/>
+            <a:ext cx="734625" cy="307777"/>
+          </a:xfrm>
+          <a:prstGeom prst="rect">
+            <a:avLst/>
+          </a:prstGeom>
+          <a:noFill/>
+        </p:spPr>
+        <p:txBody>
+          <a:bodyPr wrap="none" rtlCol="0">
+            <a:spAutoFit/>
+          </a:bodyPr>
+          <a:lstStyle/>
+          <a:p>
+            <a:pPr algn="ctr"/>
+            <a:r>
+              <a:rPr lang="en-US" sz="1400" dirty="0" smtClean="0"/>
+              <a:t>Get key</a:t>
+            </a:r>
+            <a:endParaRPr lang="en-US" sz="1400" dirty="0"/>
+          </a:p>
+        </p:txBody>
+      </p:sp>
     </p:spTree>
     <p:extLst>
       <p:ext uri="{BB962C8B-B14F-4D97-AF65-F5344CB8AC3E}">

</xml_diff>